<commit_message>
Upload of Project 1 Documents
</commit_message>
<xml_diff>
--- a/GA Project 1/GA Project 1 Slides.pptx
+++ b/GA Project 1/GA Project 1 Slides.pptx
@@ -274,6 +274,11 @@
       </a:defRPr>
     </a:lvl9pPr>
   </p:defaultTextStyle>
+  <p:extLst>
+    <p:ext uri="{EFAFB233-063F-42B5-8137-9DF3F51BA10A}">
+      <p15:sldGuideLst xmlns:p15="http://schemas.microsoft.com/office/powerpoint/2012/main"/>
+    </p:ext>
+  </p:extLst>
 </p:presentation>
 </file>
 
@@ -14939,7 +14944,15 @@
           <a:p>
             <a:r>
               <a:rPr lang="en-US" sz="2000" dirty="0"/>
-              <a:t>Participation increased by 15% in 2019 despite ACT being mandatory in the state.</a:t>
+              <a:t>Participation increased </a:t>
+            </a:r>
+            <a:r>
+              <a:rPr lang="en-US" sz="2000"/>
+              <a:t>by 14% </a:t>
+            </a:r>
+            <a:r>
+              <a:rPr lang="en-US" sz="2000" dirty="0"/>
+              <a:t>in 2019 despite ACT being mandatory in the state.</a:t>
             </a:r>
             <a:r>
               <a:rPr lang="en-US" sz="1400" dirty="0"/>

</xml_diff>